<commit_message>
Updates to design diagrams
</commit_message>
<xml_diff>
--- a/docs/design/design-diagrams.pptx
+++ b/docs/design/design-diagrams.pptx
@@ -18065,6 +18065,13 @@
   <p:clrMapOvr>
     <a:masterClrMapping/>
   </p:clrMapOvr>
+  <p:timing>
+    <p:tnLst>
+      <p:par>
+        <p:cTn id="1" dur="indefinite" restart="never" nodeType="tmRoot"/>
+      </p:par>
+    </p:tnLst>
+  </p:timing>
 </p:sld>
 </file>
 

</xml_diff>